<commit_message>
what the fuck am i doing with my life
</commit_message>
<xml_diff>
--- a/Johann Wolfgang von Goethe.pptx
+++ b/Johann Wolfgang von Goethe.pptx
@@ -6,6 +6,7 @@
   </p:sldMasterIdLst>
   <p:sldIdLst>
     <p:sldId id="256" r:id="rId2"/>
+    <p:sldId id="257" r:id="rId3"/>
   </p:sldIdLst>
   <p:sldSz cx="12192000" cy="6858000"/>
   <p:notesSz cx="6858000" cy="9144000"/>
@@ -3370,7 +3371,7 @@
           <a:p>
             <a:r>
               <a:rPr lang="en-CZ" dirty="0"/>
-              <a:t>johan</a:t>
+              <a:t>Johann Wolfgang von Goethe</a:t>
             </a:r>
           </a:p>
         </p:txBody>
@@ -3397,8 +3398,8 @@
           <a:lstStyle/>
           <a:p>
             <a:r>
-              <a:rPr lang="en-CZ"/>
-              <a:t>johan</a:t>
+              <a:rPr lang="en-CZ" dirty="0"/>
+              <a:t>Martin Müller</a:t>
             </a:r>
           </a:p>
         </p:txBody>
@@ -3407,6 +3408,155 @@
     <p:extLst>
       <p:ext uri="{BB962C8B-B14F-4D97-AF65-F5344CB8AC3E}">
         <p14:creationId xmlns:p14="http://schemas.microsoft.com/office/powerpoint/2010/main" val="949629273"/>
+      </p:ext>
+    </p:extLst>
+  </p:cSld>
+  <p:clrMapOvr>
+    <a:masterClrMapping/>
+  </p:clrMapOvr>
+</p:sld>
+</file>
+
+<file path=ppt/slides/slide2.xml><?xml version="1.0" encoding="utf-8"?>
+<p:sld xmlns:a="http://schemas.openxmlformats.org/drawingml/2006/main" xmlns:r="http://schemas.openxmlformats.org/officeDocument/2006/relationships" xmlns:p="http://schemas.openxmlformats.org/presentationml/2006/main">
+  <p:cSld>
+    <p:spTree>
+      <p:nvGrpSpPr>
+        <p:cNvPr id="1" name=""/>
+        <p:cNvGrpSpPr/>
+        <p:nvPr/>
+      </p:nvGrpSpPr>
+      <p:grpSpPr>
+        <a:xfrm>
+          <a:off x="0" y="0"/>
+          <a:ext cx="0" cy="0"/>
+          <a:chOff x="0" y="0"/>
+          <a:chExt cx="0" cy="0"/>
+        </a:xfrm>
+      </p:grpSpPr>
+      <p:sp>
+        <p:nvSpPr>
+          <p:cNvPr id="2" name="Title 1">
+            <a:extLst>
+              <a:ext uri="{FF2B5EF4-FFF2-40B4-BE49-F238E27FC236}">
+                <a16:creationId xmlns:a16="http://schemas.microsoft.com/office/drawing/2014/main" id="{B8D5DE5F-B101-A68D-A507-552C56A7AFE8}"/>
+              </a:ext>
+            </a:extLst>
+          </p:cNvPr>
+          <p:cNvSpPr>
+            <a:spLocks noGrp="1"/>
+          </p:cNvSpPr>
+          <p:nvPr>
+            <p:ph type="title"/>
+          </p:nvPr>
+        </p:nvSpPr>
+        <p:spPr/>
+        <p:txBody>
+          <a:bodyPr/>
+          <a:lstStyle/>
+          <a:p>
+            <a:r>
+              <a:rPr lang="en-CZ" dirty="0"/>
+              <a:t>Kdo byl Goethe?</a:t>
+            </a:r>
+          </a:p>
+        </p:txBody>
+      </p:sp>
+      <p:sp>
+        <p:nvSpPr>
+          <p:cNvPr id="4" name="Text Placeholder 3">
+            <a:extLst>
+              <a:ext uri="{FF2B5EF4-FFF2-40B4-BE49-F238E27FC236}">
+                <a16:creationId xmlns:a16="http://schemas.microsoft.com/office/drawing/2014/main" id="{B46F068A-8F76-BFB5-9312-AE9295F3E174}"/>
+              </a:ext>
+            </a:extLst>
+          </p:cNvPr>
+          <p:cNvSpPr>
+            <a:spLocks noGrp="1"/>
+          </p:cNvSpPr>
+          <p:nvPr>
+            <p:ph type="body" sz="half" idx="2"/>
+          </p:nvPr>
+        </p:nvSpPr>
+        <p:spPr>
+          <a:xfrm>
+            <a:off x="839788" y="2057400"/>
+            <a:ext cx="4873625" cy="3811588"/>
+          </a:xfrm>
+        </p:spPr>
+        <p:txBody>
+          <a:bodyPr/>
+          <a:lstStyle/>
+          <a:p>
+            <a:pPr marL="285750" indent="-285750">
+              <a:buFontTx/>
+              <a:buChar char="-"/>
+            </a:pPr>
+            <a:r>
+              <a:rPr lang="en-GB" dirty="0"/>
+              <a:t>n</a:t>
+            </a:r>
+            <a:r>
+              <a:rPr lang="en-CZ" dirty="0"/>
+              <a:t>arozen 28. 8. 1749</a:t>
+            </a:r>
+          </a:p>
+          <a:p>
+            <a:pPr marL="285750" indent="-285750">
+              <a:buFontTx/>
+              <a:buChar char="-"/>
+            </a:pPr>
+            <a:r>
+              <a:rPr lang="en-GB" dirty="0"/>
+              <a:t>z</a:t>
+            </a:r>
+            <a:r>
+              <a:rPr lang="en-CZ" dirty="0"/>
+              <a:t>emřel 22. 3. 1832 na infarkt</a:t>
+            </a:r>
+          </a:p>
+          <a:p>
+            <a:pPr marL="285750" indent="-285750">
+              <a:buFontTx/>
+              <a:buChar char="-"/>
+            </a:pPr>
+            <a:endParaRPr lang="en-CZ" dirty="0"/>
+          </a:p>
+        </p:txBody>
+      </p:sp>
+      <p:pic>
+        <p:nvPicPr>
+          <p:cNvPr id="9" name="Content Placeholder 8" descr="A cartoon of a person&#10;&#10;Description automatically generated with medium confidence">
+            <a:extLst>
+              <a:ext uri="{FF2B5EF4-FFF2-40B4-BE49-F238E27FC236}">
+                <a16:creationId xmlns:a16="http://schemas.microsoft.com/office/drawing/2014/main" id="{4369A65F-7DCB-D320-E353-34D25560C412}"/>
+              </a:ext>
+            </a:extLst>
+          </p:cNvPr>
+          <p:cNvPicPr>
+            <a:picLocks noGrp="1" noChangeAspect="1"/>
+          </p:cNvPicPr>
+          <p:nvPr>
+            <p:ph idx="1"/>
+          </p:nvPr>
+        </p:nvPicPr>
+        <p:blipFill>
+          <a:blip r:embed="rId2"/>
+          <a:stretch>
+            <a:fillRect/>
+          </a:stretch>
+        </p:blipFill>
+        <p:spPr>
+          <a:xfrm>
+            <a:off x="6478587" y="995363"/>
+            <a:ext cx="4873625" cy="4873625"/>
+          </a:xfrm>
+        </p:spPr>
+      </p:pic>
+    </p:spTree>
+    <p:extLst>
+      <p:ext uri="{BB962C8B-B14F-4D97-AF65-F5344CB8AC3E}">
+        <p14:creationId xmlns:p14="http://schemas.microsoft.com/office/powerpoint/2010/main" val="3556258831"/>
       </p:ext>
     </p:extLst>
   </p:cSld>

</xml_diff>

<commit_message>
ain't doing nothin' more yippeee
</commit_message>
<xml_diff>
--- a/Johann Wolfgang von Goethe.pptx
+++ b/Johann Wolfgang von Goethe.pptx
@@ -3520,6 +3520,20 @@
               <a:buFontTx/>
               <a:buChar char="-"/>
             </a:pPr>
+            <a:r>
+              <a:rPr lang="en-GB" dirty="0"/>
+              <a:t>n</a:t>
+            </a:r>
+            <a:r>
+              <a:rPr lang="en-CZ" dirty="0"/>
+              <a:t>ěmecký spisovatel</a:t>
+            </a:r>
+          </a:p>
+          <a:p>
+            <a:pPr marL="285750" indent="-285750">
+              <a:buFontTx/>
+              <a:buChar char="-"/>
+            </a:pPr>
             <a:endParaRPr lang="en-CZ" dirty="0"/>
           </a:p>
         </p:txBody>

</xml_diff>